<commit_message>
Changes to research paper and ppt
</commit_message>
<xml_diff>
--- a/24MSP3075_Review_PPT.pptx
+++ b/24MSP3075_Review_PPT.pptx
@@ -5342,6 +5342,17 @@
               </a:rPr>
               <a:t>Traditional Approaches</a:t>
             </a:r>
+            <a:r>
+              <a:rPr lang="en-GB" sz="4000" b="1" baseline="30000" dirty="0">
+                <a:latin typeface="Times New Roman" panose="02020603050405020304" pitchFamily="18" charset="0"/>
+                <a:cs typeface="Times New Roman" panose="02020603050405020304" pitchFamily="18" charset="0"/>
+              </a:rPr>
+              <a:t>[1]</a:t>
+            </a:r>
+            <a:endParaRPr lang="en-GB" sz="4000" b="1" dirty="0">
+              <a:latin typeface="Times New Roman" panose="02020603050405020304" pitchFamily="18" charset="0"/>
+              <a:cs typeface="Times New Roman" panose="02020603050405020304" pitchFamily="18" charset="0"/>
+            </a:endParaRPr>
           </a:p>
           <a:p>
             <a:pPr marL="0" indent="0" algn="just">
@@ -5399,85 +5410,110 @@
       </p:grpSpPr>
       <p:sp>
         <p:nvSpPr>
-          <p:cNvPr id="2" name="Title 1">
-            <a:extLst>
-              <a:ext uri="{FF2B5EF4-FFF2-40B4-BE49-F238E27FC236}">
-                <a16:creationId xmlns:a16="http://schemas.microsoft.com/office/drawing/2014/main" id="{302D035C-6AE2-4B85-B9CB-F753CC8317FE}"/>
-              </a:ext>
-            </a:extLst>
-          </p:cNvPr>
-          <p:cNvSpPr>
-            <a:spLocks noGrp="1"/>
-          </p:cNvSpPr>
-          <p:nvPr>
-            <p:ph type="title"/>
-          </p:nvPr>
-        </p:nvSpPr>
-        <p:spPr/>
-        <p:txBody>
-          <a:bodyPr/>
-          <a:lstStyle/>
-          <a:p>
-            <a:r>
-              <a:rPr lang="en-GB" dirty="0">
-                <a:latin typeface="Times New Roman" panose="02020603050405020304" pitchFamily="18" charset="0"/>
-                <a:cs typeface="Times New Roman" panose="02020603050405020304" pitchFamily="18" charset="0"/>
-              </a:rPr>
-              <a:t>Literature Review</a:t>
-            </a:r>
-            <a:endParaRPr lang="en-IN" dirty="0">
+          <p:cNvPr id="3" name="Content Placeholder 2">
+            <a:extLst>
+              <a:ext uri="{FF2B5EF4-FFF2-40B4-BE49-F238E27FC236}">
+                <a16:creationId xmlns:a16="http://schemas.microsoft.com/office/drawing/2014/main" id="{91A1D198-4023-0104-43AF-805D96CBA176}"/>
+              </a:ext>
+            </a:extLst>
+          </p:cNvPr>
+          <p:cNvSpPr>
+            <a:spLocks noGrp="1"/>
+          </p:cNvSpPr>
+          <p:nvPr>
+            <p:ph idx="1"/>
+          </p:nvPr>
+        </p:nvSpPr>
+        <p:spPr/>
+        <p:txBody>
+          <a:bodyPr>
+            <a:normAutofit/>
+          </a:bodyPr>
+          <a:lstStyle/>
+          <a:p>
+            <a:pPr marL="0" indent="0" algn="just">
+              <a:buNone/>
+            </a:pPr>
+            <a:r>
+              <a:rPr lang="en-GB" sz="4000" b="1" dirty="0">
+                <a:latin typeface="Times New Roman" panose="02020603050405020304" pitchFamily="18" charset="0"/>
+                <a:cs typeface="Times New Roman" panose="02020603050405020304" pitchFamily="18" charset="0"/>
+              </a:rPr>
+              <a:t>Machine Learning Approaches</a:t>
+            </a:r>
+            <a:r>
+              <a:rPr lang="en-GB" sz="4000" b="1" baseline="30000" dirty="0">
+                <a:latin typeface="Times New Roman" panose="02020603050405020304" pitchFamily="18" charset="0"/>
+                <a:cs typeface="Times New Roman" panose="02020603050405020304" pitchFamily="18" charset="0"/>
+              </a:rPr>
+              <a:t>[2][4][5]</a:t>
+            </a:r>
+            <a:endParaRPr lang="en-GB" sz="4000" b="1" dirty="0">
               <a:latin typeface="Times New Roman" panose="02020603050405020304" pitchFamily="18" charset="0"/>
               <a:cs typeface="Times New Roman" panose="02020603050405020304" pitchFamily="18" charset="0"/>
             </a:endParaRPr>
           </a:p>
-        </p:txBody>
-      </p:sp>
-      <p:sp>
-        <p:nvSpPr>
-          <p:cNvPr id="3" name="Content Placeholder 2">
-            <a:extLst>
-              <a:ext uri="{FF2B5EF4-FFF2-40B4-BE49-F238E27FC236}">
-                <a16:creationId xmlns:a16="http://schemas.microsoft.com/office/drawing/2014/main" id="{91A1D198-4023-0104-43AF-805D96CBA176}"/>
-              </a:ext>
-            </a:extLst>
-          </p:cNvPr>
-          <p:cNvSpPr>
-            <a:spLocks noGrp="1"/>
-          </p:cNvSpPr>
-          <p:nvPr>
-            <p:ph idx="1"/>
-          </p:nvPr>
-        </p:nvSpPr>
-        <p:spPr/>
-        <p:txBody>
-          <a:bodyPr>
-            <a:normAutofit/>
-          </a:bodyPr>
-          <a:lstStyle/>
           <a:p>
             <a:pPr marL="0" indent="0" algn="just">
               <a:buNone/>
             </a:pPr>
             <a:r>
-              <a:rPr lang="en-GB" sz="4000" b="1" dirty="0">
-                <a:latin typeface="Times New Roman" panose="02020603050405020304" pitchFamily="18" charset="0"/>
-                <a:cs typeface="Times New Roman" panose="02020603050405020304" pitchFamily="18" charset="0"/>
-              </a:rPr>
-              <a:t>Machine Learning Approaches</a:t>
-            </a:r>
-          </a:p>
-          <a:p>
-            <a:pPr marL="0" indent="0" algn="just">
-              <a:buNone/>
-            </a:pPr>
-            <a:r>
               <a:rPr lang="en-GB" sz="4000" dirty="0">
                 <a:latin typeface="Times New Roman" panose="02020603050405020304" pitchFamily="18" charset="0"/>
                 <a:cs typeface="Times New Roman" panose="02020603050405020304" pitchFamily="18" charset="0"/>
               </a:rPr>
-              <a:t>Machine learning introduced algorithms like Naive Bayes, Support Vector Machines, and Logistic Regression. These models use features extracted from text (e.g., frequency of words) to classify sentiments, offering better accuracy than lexicon-based methods.</a:t>
+              <a:t>Machine learning introduced algorithms like Naive Bayes</a:t>
+            </a:r>
+            <a:r>
+              <a:rPr lang="en-GB" sz="4000" baseline="30000" dirty="0">
+                <a:latin typeface="Times New Roman" panose="02020603050405020304" pitchFamily="18" charset="0"/>
+                <a:cs typeface="Times New Roman" panose="02020603050405020304" pitchFamily="18" charset="0"/>
+              </a:rPr>
+              <a:t>[3]</a:t>
+            </a:r>
+            <a:r>
+              <a:rPr lang="en-GB" sz="4000" dirty="0">
+                <a:latin typeface="Times New Roman" panose="02020603050405020304" pitchFamily="18" charset="0"/>
+                <a:cs typeface="Times New Roman" panose="02020603050405020304" pitchFamily="18" charset="0"/>
+              </a:rPr>
+              <a:t>, Support Vector Machines, and Logistic Regression. These models use features extracted from text (e.g., frequency of words) to classify sentiments, offering better accuracy than lexicon-based methods.</a:t>
             </a:r>
             <a:endParaRPr lang="en-IN" sz="4000" dirty="0">
+              <a:latin typeface="Times New Roman" panose="02020603050405020304" pitchFamily="18" charset="0"/>
+              <a:cs typeface="Times New Roman" panose="02020603050405020304" pitchFamily="18" charset="0"/>
+            </a:endParaRPr>
+          </a:p>
+        </p:txBody>
+      </p:sp>
+      <p:sp>
+        <p:nvSpPr>
+          <p:cNvPr id="2" name="Title 1">
+            <a:extLst>
+              <a:ext uri="{FF2B5EF4-FFF2-40B4-BE49-F238E27FC236}">
+                <a16:creationId xmlns:a16="http://schemas.microsoft.com/office/drawing/2014/main" id="{302D035C-6AE2-4B85-B9CB-F753CC8317FE}"/>
+              </a:ext>
+            </a:extLst>
+          </p:cNvPr>
+          <p:cNvSpPr>
+            <a:spLocks noGrp="1"/>
+          </p:cNvSpPr>
+          <p:nvPr>
+            <p:ph type="title"/>
+          </p:nvPr>
+        </p:nvSpPr>
+        <p:spPr/>
+        <p:txBody>
+          <a:bodyPr/>
+          <a:lstStyle/>
+          <a:p>
+            <a:r>
+              <a:rPr lang="en-GB" dirty="0">
+                <a:latin typeface="Times New Roman" panose="02020603050405020304" pitchFamily="18" charset="0"/>
+                <a:cs typeface="Times New Roman" panose="02020603050405020304" pitchFamily="18" charset="0"/>
+              </a:rPr>
+              <a:t>Literature Review</a:t>
+            </a:r>
+            <a:endParaRPr lang="en-IN" dirty="0">
               <a:latin typeface="Times New Roman" panose="02020603050405020304" pitchFamily="18" charset="0"/>
               <a:cs typeface="Times New Roman" panose="02020603050405020304" pitchFamily="18" charset="0"/>
             </a:endParaRPr>
@@ -5588,6 +5624,17 @@
               </a:rPr>
               <a:t>Modern Deep Learning Approaches</a:t>
             </a:r>
+            <a:r>
+              <a:rPr lang="en-GB" sz="4000" b="1" baseline="30000" dirty="0">
+                <a:latin typeface="Times New Roman" panose="02020603050405020304" pitchFamily="18" charset="0"/>
+                <a:cs typeface="Times New Roman" panose="02020603050405020304" pitchFamily="18" charset="0"/>
+              </a:rPr>
+              <a:t>[3]</a:t>
+            </a:r>
+            <a:endParaRPr lang="en-GB" sz="4000" b="1" dirty="0">
+              <a:latin typeface="Times New Roman" panose="02020603050405020304" pitchFamily="18" charset="0"/>
+              <a:cs typeface="Times New Roman" panose="02020603050405020304" pitchFamily="18" charset="0"/>
+            </a:endParaRPr>
           </a:p>
           <a:p>
             <a:pPr marL="0" indent="0" algn="just">

</xml_diff>